<commit_message>
hw1 report and slide
</commit_message>
<xml_diff>
--- a/hw1/report/img/img.pptx
+++ b/hw1/report/img/img.pptx
@@ -5,10 +5,11 @@
     <p:sldMasterId id="2147483660" r:id="rId1"/>
   </p:sldMasterIdLst>
   <p:notesMasterIdLst>
-    <p:notesMasterId r:id="rId3"/>
+    <p:notesMasterId r:id="rId4"/>
   </p:notesMasterIdLst>
   <p:sldIdLst>
     <p:sldId id="361" r:id="rId2"/>
+    <p:sldId id="362" r:id="rId3"/>
   </p:sldIdLst>
   <p:sldSz cx="21599525" cy="21599525"/>
   <p:notesSz cx="6858000" cy="9144000"/>
@@ -197,7 +198,7 @@
           <a:p>
             <a:fld id="{5DF3E262-87A9-4FD0-801D-11C30F528353}" type="datetimeFigureOut">
               <a:rPr lang="zh-TW" altLang="en-US" smtClean="0"/>
-              <a:t>2021/10/11</a:t>
+              <a:t>2021/10/12</a:t>
             </a:fld>
             <a:endParaRPr lang="zh-TW" altLang="en-US"/>
           </a:p>
@@ -549,6 +550,90 @@
 </p:notes>
 </file>
 
+<file path=ppt/notesSlides/notesSlide2.xml><?xml version="1.0" encoding="utf-8"?>
+<p:notes xmlns:a="http://schemas.openxmlformats.org/drawingml/2006/main" xmlns:r="http://schemas.openxmlformats.org/officeDocument/2006/relationships" xmlns:p="http://schemas.openxmlformats.org/presentationml/2006/main">
+  <p:cSld>
+    <p:spTree>
+      <p:nvGrpSpPr>
+        <p:cNvPr id="1" name=""/>
+        <p:cNvGrpSpPr/>
+        <p:nvPr/>
+      </p:nvGrpSpPr>
+      <p:grpSpPr>
+        <a:xfrm>
+          <a:off x="0" y="0"/>
+          <a:ext cx="0" cy="0"/>
+          <a:chOff x="0" y="0"/>
+          <a:chExt cx="0" cy="0"/>
+        </a:xfrm>
+      </p:grpSpPr>
+      <p:sp>
+        <p:nvSpPr>
+          <p:cNvPr id="2" name="投影片圖像版面配置區 1"/>
+          <p:cNvSpPr>
+            <a:spLocks noGrp="1" noRot="1" noChangeAspect="1"/>
+          </p:cNvSpPr>
+          <p:nvPr>
+            <p:ph type="sldImg"/>
+          </p:nvPr>
+        </p:nvSpPr>
+        <p:spPr/>
+      </p:sp>
+      <p:sp>
+        <p:nvSpPr>
+          <p:cNvPr id="3" name="備忘稿版面配置區 2"/>
+          <p:cNvSpPr>
+            <a:spLocks noGrp="1"/>
+          </p:cNvSpPr>
+          <p:nvPr>
+            <p:ph type="body" idx="1"/>
+          </p:nvPr>
+        </p:nvSpPr>
+        <p:spPr/>
+        <p:txBody>
+          <a:bodyPr/>
+          <a:lstStyle/>
+          <a:p>
+            <a:endParaRPr lang="zh-TW" altLang="en-US" dirty="0"/>
+          </a:p>
+        </p:txBody>
+      </p:sp>
+      <p:sp>
+        <p:nvSpPr>
+          <p:cNvPr id="4" name="投影片編號版面配置區 3"/>
+          <p:cNvSpPr>
+            <a:spLocks noGrp="1"/>
+          </p:cNvSpPr>
+          <p:nvPr>
+            <p:ph type="sldNum" sz="quarter" idx="10"/>
+          </p:nvPr>
+        </p:nvSpPr>
+        <p:spPr/>
+        <p:txBody>
+          <a:bodyPr/>
+          <a:lstStyle/>
+          <a:p>
+            <a:fld id="{6E1C9CAC-9358-49DD-9977-4B7D28ACBE36}" type="slidenum">
+              <a:rPr lang="zh-TW" altLang="en-US" smtClean="0"/>
+              <a:t>2</a:t>
+            </a:fld>
+            <a:endParaRPr lang="zh-TW" altLang="en-US"/>
+          </a:p>
+        </p:txBody>
+      </p:sp>
+    </p:spTree>
+    <p:extLst>
+      <p:ext uri="{BB962C8B-B14F-4D97-AF65-F5344CB8AC3E}">
+        <p14:creationId xmlns:p14="http://schemas.microsoft.com/office/powerpoint/2010/main" val="2632497234"/>
+      </p:ext>
+    </p:extLst>
+  </p:cSld>
+  <p:clrMapOvr>
+    <a:masterClrMapping/>
+  </p:clrMapOvr>
+</p:notes>
+</file>
+
 <file path=ppt/slideLayouts/slideLayout1.xml><?xml version="1.0" encoding="utf-8"?>
 <p:sldLayout xmlns:a="http://schemas.openxmlformats.org/drawingml/2006/main" xmlns:r="http://schemas.openxmlformats.org/officeDocument/2006/relationships" xmlns:p="http://schemas.openxmlformats.org/presentationml/2006/main" type="title" preserve="1">
   <p:cSld name="標題投影片">
@@ -680,7 +765,7 @@
           <a:p>
             <a:fld id="{3E906AA8-AB23-40FA-BFDB-6A33FBF1CFF0}" type="datetimeFigureOut">
               <a:rPr lang="zh-TW" altLang="en-US" smtClean="0"/>
-              <a:t>2021/10/11</a:t>
+              <a:t>2021/10/12</a:t>
             </a:fld>
             <a:endParaRPr lang="zh-TW" altLang="en-US"/>
           </a:p>
@@ -850,7 +935,7 @@
           <a:p>
             <a:fld id="{3E906AA8-AB23-40FA-BFDB-6A33FBF1CFF0}" type="datetimeFigureOut">
               <a:rPr lang="zh-TW" altLang="en-US" smtClean="0"/>
-              <a:t>2021/10/11</a:t>
+              <a:t>2021/10/12</a:t>
             </a:fld>
             <a:endParaRPr lang="zh-TW" altLang="en-US"/>
           </a:p>
@@ -1030,7 +1115,7 @@
           <a:p>
             <a:fld id="{3E906AA8-AB23-40FA-BFDB-6A33FBF1CFF0}" type="datetimeFigureOut">
               <a:rPr lang="zh-TW" altLang="en-US" smtClean="0"/>
-              <a:t>2021/10/11</a:t>
+              <a:t>2021/10/12</a:t>
             </a:fld>
             <a:endParaRPr lang="zh-TW" altLang="en-US"/>
           </a:p>
@@ -1200,7 +1285,7 @@
           <a:p>
             <a:fld id="{3E906AA8-AB23-40FA-BFDB-6A33FBF1CFF0}" type="datetimeFigureOut">
               <a:rPr lang="zh-TW" altLang="en-US" smtClean="0"/>
-              <a:t>2021/10/11</a:t>
+              <a:t>2021/10/12</a:t>
             </a:fld>
             <a:endParaRPr lang="zh-TW" altLang="en-US"/>
           </a:p>
@@ -1444,7 +1529,7 @@
           <a:p>
             <a:fld id="{3E906AA8-AB23-40FA-BFDB-6A33FBF1CFF0}" type="datetimeFigureOut">
               <a:rPr lang="zh-TW" altLang="en-US" smtClean="0"/>
-              <a:t>2021/10/11</a:t>
+              <a:t>2021/10/12</a:t>
             </a:fld>
             <a:endParaRPr lang="zh-TW" altLang="en-US"/>
           </a:p>
@@ -1676,7 +1761,7 @@
           <a:p>
             <a:fld id="{3E906AA8-AB23-40FA-BFDB-6A33FBF1CFF0}" type="datetimeFigureOut">
               <a:rPr lang="zh-TW" altLang="en-US" smtClean="0"/>
-              <a:t>2021/10/11</a:t>
+              <a:t>2021/10/12</a:t>
             </a:fld>
             <a:endParaRPr lang="zh-TW" altLang="en-US"/>
           </a:p>
@@ -2043,7 +2128,7 @@
           <a:p>
             <a:fld id="{3E906AA8-AB23-40FA-BFDB-6A33FBF1CFF0}" type="datetimeFigureOut">
               <a:rPr lang="zh-TW" altLang="en-US" smtClean="0"/>
-              <a:t>2021/10/11</a:t>
+              <a:t>2021/10/12</a:t>
             </a:fld>
             <a:endParaRPr lang="zh-TW" altLang="en-US"/>
           </a:p>
@@ -2161,7 +2246,7 @@
           <a:p>
             <a:fld id="{3E906AA8-AB23-40FA-BFDB-6A33FBF1CFF0}" type="datetimeFigureOut">
               <a:rPr lang="zh-TW" altLang="en-US" smtClean="0"/>
-              <a:t>2021/10/11</a:t>
+              <a:t>2021/10/12</a:t>
             </a:fld>
             <a:endParaRPr lang="zh-TW" altLang="en-US"/>
           </a:p>
@@ -2256,7 +2341,7 @@
           <a:p>
             <a:fld id="{3E906AA8-AB23-40FA-BFDB-6A33FBF1CFF0}" type="datetimeFigureOut">
               <a:rPr lang="zh-TW" altLang="en-US" smtClean="0"/>
-              <a:t>2021/10/11</a:t>
+              <a:t>2021/10/12</a:t>
             </a:fld>
             <a:endParaRPr lang="zh-TW" altLang="en-US"/>
           </a:p>
@@ -2533,7 +2618,7 @@
           <a:p>
             <a:fld id="{3E906AA8-AB23-40FA-BFDB-6A33FBF1CFF0}" type="datetimeFigureOut">
               <a:rPr lang="zh-TW" altLang="en-US" smtClean="0"/>
-              <a:t>2021/10/11</a:t>
+              <a:t>2021/10/12</a:t>
             </a:fld>
             <a:endParaRPr lang="zh-TW" altLang="en-US"/>
           </a:p>
@@ -2790,7 +2875,7 @@
           <a:p>
             <a:fld id="{3E906AA8-AB23-40FA-BFDB-6A33FBF1CFF0}" type="datetimeFigureOut">
               <a:rPr lang="zh-TW" altLang="en-US" smtClean="0"/>
-              <a:t>2021/10/11</a:t>
+              <a:t>2021/10/12</a:t>
             </a:fld>
             <a:endParaRPr lang="zh-TW" altLang="en-US"/>
           </a:p>
@@ -3003,7 +3088,7 @@
           <a:p>
             <a:fld id="{3E906AA8-AB23-40FA-BFDB-6A33FBF1CFF0}" type="datetimeFigureOut">
               <a:rPr lang="zh-TW" altLang="en-US" smtClean="0"/>
-              <a:t>2021/10/11</a:t>
+              <a:t>2021/10/12</a:t>
             </a:fld>
             <a:endParaRPr lang="zh-TW" altLang="en-US"/>
           </a:p>
@@ -5057,6 +5142,1672 @@
 </p:sld>
 </file>
 
+<file path=ppt/slides/slide2.xml><?xml version="1.0" encoding="utf-8"?>
+<p:sld xmlns:a="http://schemas.openxmlformats.org/drawingml/2006/main" xmlns:r="http://schemas.openxmlformats.org/officeDocument/2006/relationships" xmlns:p="http://schemas.openxmlformats.org/presentationml/2006/main">
+  <p:cSld>
+    <p:bg>
+      <p:bgPr>
+        <a:solidFill>
+          <a:schemeClr val="bg1"/>
+        </a:solidFill>
+        <a:effectLst/>
+      </p:bgPr>
+    </p:bg>
+    <p:spTree>
+      <p:nvGrpSpPr>
+        <p:cNvPr id="1" name=""/>
+        <p:cNvGrpSpPr/>
+        <p:nvPr/>
+      </p:nvGrpSpPr>
+      <p:grpSpPr>
+        <a:xfrm>
+          <a:off x="0" y="0"/>
+          <a:ext cx="0" cy="0"/>
+          <a:chOff x="0" y="0"/>
+          <a:chExt cx="0" cy="0"/>
+        </a:xfrm>
+      </p:grpSpPr>
+      <p:grpSp>
+        <p:nvGrpSpPr>
+          <p:cNvPr id="3" name="群組 2"/>
+          <p:cNvGrpSpPr/>
+          <p:nvPr/>
+        </p:nvGrpSpPr>
+        <p:grpSpPr>
+          <a:xfrm>
+            <a:off x="2075652" y="7827804"/>
+            <a:ext cx="16470353" cy="9150244"/>
+            <a:chOff x="2075652" y="7827804"/>
+            <a:chExt cx="16470353" cy="9150244"/>
+          </a:xfrm>
+        </p:grpSpPr>
+        <p:cxnSp>
+          <p:nvCxnSpPr>
+            <p:cNvPr id="117" name="直線單箭頭接點 26"/>
+            <p:cNvCxnSpPr>
+              <a:stCxn id="2" idx="1"/>
+              <a:endCxn id="116" idx="2"/>
+            </p:cNvCxnSpPr>
+            <p:nvPr/>
+          </p:nvCxnSpPr>
+          <p:spPr>
+            <a:xfrm flipV="1">
+              <a:off x="5158740" y="13769114"/>
+              <a:ext cx="0" cy="765267"/>
+            </a:xfrm>
+            <a:prstGeom prst="straightConnector1">
+              <a:avLst/>
+            </a:prstGeom>
+            <a:ln w="76200">
+              <a:solidFill>
+                <a:srgbClr val="282828"/>
+              </a:solidFill>
+              <a:tailEnd type="triangle" w="lg" len="lg"/>
+            </a:ln>
+          </p:spPr>
+          <p:style>
+            <a:lnRef idx="1">
+              <a:schemeClr val="accent1"/>
+            </a:lnRef>
+            <a:fillRef idx="0">
+              <a:schemeClr val="accent1"/>
+            </a:fillRef>
+            <a:effectRef idx="0">
+              <a:schemeClr val="accent1"/>
+            </a:effectRef>
+            <a:fontRef idx="minor">
+              <a:schemeClr val="tx1"/>
+            </a:fontRef>
+          </p:style>
+        </p:cxnSp>
+        <p:sp>
+          <p:nvSpPr>
+            <p:cNvPr id="116" name="圓角矩形 115"/>
+            <p:cNvSpPr/>
+            <p:nvPr/>
+          </p:nvSpPr>
+          <p:spPr>
+            <a:xfrm>
+              <a:off x="3133416" y="12369293"/>
+              <a:ext cx="4050648" cy="1399821"/>
+            </a:xfrm>
+            <a:prstGeom prst="roundRect">
+              <a:avLst>
+                <a:gd name="adj" fmla="val 12899"/>
+              </a:avLst>
+            </a:prstGeom>
+            <a:noFill/>
+            <a:ln w="63500">
+              <a:solidFill>
+                <a:srgbClr val="282828"/>
+              </a:solidFill>
+            </a:ln>
+          </p:spPr>
+          <p:style>
+            <a:lnRef idx="2">
+              <a:schemeClr val="accent1">
+                <a:shade val="50000"/>
+              </a:schemeClr>
+            </a:lnRef>
+            <a:fillRef idx="1">
+              <a:schemeClr val="accent1"/>
+            </a:fillRef>
+            <a:effectRef idx="0">
+              <a:schemeClr val="accent1"/>
+            </a:effectRef>
+            <a:fontRef idx="minor">
+              <a:schemeClr val="lt1"/>
+            </a:fontRef>
+          </p:style>
+          <p:txBody>
+            <a:bodyPr rtlCol="0" anchor="ctr"/>
+            <a:lstStyle/>
+            <a:p>
+              <a:pPr algn="ctr"/>
+              <a:r>
+                <a:rPr lang="en-US" altLang="zh-TW" sz="3600" dirty="0" smtClean="0">
+                  <a:solidFill>
+                    <a:srgbClr val="282828"/>
+                  </a:solidFill>
+                  <a:latin typeface="SauceCodePro Nerd Font" panose="020B0509030403020204" pitchFamily="49" charset="0"/>
+                </a:rPr>
+                <a:t>Create</a:t>
+              </a:r>
+            </a:p>
+            <a:p>
+              <a:pPr algn="ctr"/>
+              <a:r>
+                <a:rPr lang="en-US" altLang="zh-TW" sz="3600" dirty="0" smtClean="0">
+                  <a:solidFill>
+                    <a:srgbClr val="282828"/>
+                  </a:solidFill>
+                  <a:latin typeface="SauceCodePro Nerd Font" panose="020B0509030403020204" pitchFamily="49" charset="0"/>
+                </a:rPr>
+                <a:t>cache</a:t>
+              </a:r>
+              <a:endParaRPr lang="zh-TW" altLang="en-US" sz="3600" dirty="0">
+                <a:solidFill>
+                  <a:srgbClr val="282828"/>
+                </a:solidFill>
+                <a:latin typeface="SauceCodePro Nerd Font" panose="020B0509030403020204" pitchFamily="49" charset="0"/>
+              </a:endParaRPr>
+            </a:p>
+          </p:txBody>
+        </p:sp>
+        <p:sp>
+          <p:nvSpPr>
+            <p:cNvPr id="136" name="圓角矩形 135"/>
+            <p:cNvSpPr/>
+            <p:nvPr/>
+          </p:nvSpPr>
+          <p:spPr>
+            <a:xfrm>
+              <a:off x="9498948" y="9577558"/>
+              <a:ext cx="2600016" cy="1839447"/>
+            </a:xfrm>
+            <a:prstGeom prst="roundRect">
+              <a:avLst>
+                <a:gd name="adj" fmla="val 12899"/>
+              </a:avLst>
+            </a:prstGeom>
+            <a:noFill/>
+            <a:ln w="31750">
+              <a:solidFill>
+                <a:srgbClr val="282828"/>
+              </a:solidFill>
+            </a:ln>
+          </p:spPr>
+          <p:style>
+            <a:lnRef idx="2">
+              <a:schemeClr val="accent1">
+                <a:shade val="50000"/>
+              </a:schemeClr>
+            </a:lnRef>
+            <a:fillRef idx="1">
+              <a:schemeClr val="accent1"/>
+            </a:fillRef>
+            <a:effectRef idx="0">
+              <a:schemeClr val="accent1"/>
+            </a:effectRef>
+            <a:fontRef idx="minor">
+              <a:schemeClr val="lt1"/>
+            </a:fontRef>
+          </p:style>
+          <p:txBody>
+            <a:bodyPr rtlCol="0" anchor="ctr"/>
+            <a:lstStyle/>
+            <a:p>
+              <a:pPr algn="ctr"/>
+              <a:r>
+                <a:rPr lang="en-US" altLang="zh-TW" sz="3600" dirty="0" smtClean="0">
+                  <a:solidFill>
+                    <a:srgbClr val="282828"/>
+                  </a:solidFill>
+                  <a:latin typeface="SauceCodePro Nerd Font" panose="020B0509030403020204" pitchFamily="49" charset="0"/>
+                </a:rPr>
+                <a:t>Search</a:t>
+              </a:r>
+            </a:p>
+            <a:p>
+              <a:pPr algn="ctr"/>
+              <a:r>
+                <a:rPr lang="en-US" altLang="zh-TW" sz="3600" dirty="0" smtClean="0">
+                  <a:solidFill>
+                    <a:srgbClr val="282828"/>
+                  </a:solidFill>
+                  <a:latin typeface="SauceCodePro Nerd Font" panose="020B0509030403020204" pitchFamily="49" charset="0"/>
+                </a:rPr>
+                <a:t>Token</a:t>
+              </a:r>
+            </a:p>
+            <a:p>
+              <a:pPr algn="ctr"/>
+              <a:r>
+                <a:rPr lang="en-US" altLang="zh-TW" sz="3600" dirty="0" smtClean="0">
+                  <a:solidFill>
+                    <a:srgbClr val="282828"/>
+                  </a:solidFill>
+                  <a:latin typeface="SauceCodePro Nerd Font" panose="020B0509030403020204" pitchFamily="49" charset="0"/>
+                </a:rPr>
+                <a:t>index</a:t>
+              </a:r>
+              <a:endParaRPr lang="en-US" altLang="zh-TW" sz="3600" dirty="0">
+                <a:solidFill>
+                  <a:srgbClr val="282828"/>
+                </a:solidFill>
+                <a:latin typeface="SauceCodePro Nerd Font" panose="020B0509030403020204" pitchFamily="49" charset="0"/>
+              </a:endParaRPr>
+            </a:p>
+          </p:txBody>
+        </p:sp>
+        <p:cxnSp>
+          <p:nvCxnSpPr>
+            <p:cNvPr id="142" name="直線單箭頭接點 26"/>
+            <p:cNvCxnSpPr>
+              <a:stCxn id="116" idx="0"/>
+              <a:endCxn id="29" idx="3"/>
+            </p:cNvCxnSpPr>
+            <p:nvPr/>
+          </p:nvCxnSpPr>
+          <p:spPr>
+            <a:xfrm rot="16200000" flipV="1">
+              <a:off x="3095242" y="10305795"/>
+              <a:ext cx="2682209" cy="1444788"/>
+            </a:xfrm>
+            <a:prstGeom prst="bentConnector3">
+              <a:avLst>
+                <a:gd name="adj1" fmla="val 50000"/>
+              </a:avLst>
+            </a:prstGeom>
+            <a:ln w="76200">
+              <a:solidFill>
+                <a:srgbClr val="282828"/>
+              </a:solidFill>
+              <a:tailEnd type="triangle" w="lg" len="lg"/>
+            </a:ln>
+          </p:spPr>
+          <p:style>
+            <a:lnRef idx="1">
+              <a:schemeClr val="accent1"/>
+            </a:lnRef>
+            <a:fillRef idx="0">
+              <a:schemeClr val="accent1"/>
+            </a:fillRef>
+            <a:effectRef idx="0">
+              <a:schemeClr val="accent1"/>
+            </a:effectRef>
+            <a:fontRef idx="minor">
+              <a:schemeClr val="tx1"/>
+            </a:fontRef>
+          </p:style>
+        </p:cxnSp>
+        <p:sp>
+          <p:nvSpPr>
+            <p:cNvPr id="2" name="流程圖: 磁碟 1"/>
+            <p:cNvSpPr/>
+            <p:nvPr/>
+          </p:nvSpPr>
+          <p:spPr>
+            <a:xfrm>
+              <a:off x="3520440" y="14534381"/>
+              <a:ext cx="3276600" cy="1859280"/>
+            </a:xfrm>
+            <a:prstGeom prst="flowChartMagneticDisk">
+              <a:avLst/>
+            </a:prstGeom>
+            <a:solidFill>
+              <a:schemeClr val="accent4"/>
+            </a:solidFill>
+            <a:ln w="31750">
+              <a:solidFill>
+                <a:srgbClr val="282828"/>
+              </a:solidFill>
+            </a:ln>
+          </p:spPr>
+          <p:style>
+            <a:lnRef idx="2">
+              <a:schemeClr val="accent1">
+                <a:shade val="50000"/>
+              </a:schemeClr>
+            </a:lnRef>
+            <a:fillRef idx="1">
+              <a:schemeClr val="accent1"/>
+            </a:fillRef>
+            <a:effectRef idx="0">
+              <a:schemeClr val="accent1"/>
+            </a:effectRef>
+            <a:fontRef idx="minor">
+              <a:schemeClr val="lt1"/>
+            </a:fontRef>
+          </p:style>
+          <p:txBody>
+            <a:bodyPr rtlCol="0" anchor="ctr"/>
+            <a:lstStyle/>
+            <a:p>
+              <a:pPr algn="ctr"/>
+              <a:r>
+                <a:rPr lang="en-US" altLang="zh-TW" sz="3600" dirty="0">
+                  <a:solidFill>
+                    <a:srgbClr val="282828"/>
+                  </a:solidFill>
+                  <a:latin typeface="SauceCodePro Nerd Font" panose="020B0509030403020204" pitchFamily="49" charset="0"/>
+                </a:rPr>
+                <a:t>JSON</a:t>
+              </a:r>
+              <a:r>
+                <a:rPr lang="zh-TW" altLang="en-US" sz="3600" dirty="0">
+                  <a:solidFill>
+                    <a:srgbClr val="282828"/>
+                  </a:solidFill>
+                  <a:latin typeface="SauceCodePro Nerd Font" panose="020B0509030403020204" pitchFamily="49" charset="0"/>
+                </a:rPr>
+                <a:t>、</a:t>
+              </a:r>
+              <a:r>
+                <a:rPr lang="en-US" altLang="zh-TW" sz="3600" dirty="0">
+                  <a:solidFill>
+                    <a:srgbClr val="282828"/>
+                  </a:solidFill>
+                  <a:latin typeface="SauceCodePro Nerd Font" panose="020B0509030403020204" pitchFamily="49" charset="0"/>
+                </a:rPr>
+                <a:t>XML</a:t>
+              </a:r>
+              <a:endParaRPr lang="zh-TW" altLang="en-US" sz="3600" dirty="0">
+                <a:solidFill>
+                  <a:srgbClr val="282828"/>
+                </a:solidFill>
+                <a:latin typeface="SauceCodePro Nerd Font" panose="020B0509030403020204" pitchFamily="49" charset="0"/>
+              </a:endParaRPr>
+            </a:p>
+          </p:txBody>
+        </p:sp>
+        <p:cxnSp>
+          <p:nvCxnSpPr>
+            <p:cNvPr id="24" name="直線單箭頭接點 26"/>
+            <p:cNvCxnSpPr>
+              <a:stCxn id="116" idx="0"/>
+              <a:endCxn id="30" idx="3"/>
+            </p:cNvCxnSpPr>
+            <p:nvPr/>
+          </p:nvCxnSpPr>
+          <p:spPr>
+            <a:xfrm rot="5400000" flipH="1" flipV="1">
+              <a:off x="5695258" y="10880487"/>
+              <a:ext cx="952288" cy="2025324"/>
+            </a:xfrm>
+            <a:prstGeom prst="bentConnector3">
+              <a:avLst>
+                <a:gd name="adj1" fmla="val 35597"/>
+              </a:avLst>
+            </a:prstGeom>
+            <a:ln w="76200">
+              <a:solidFill>
+                <a:srgbClr val="282828"/>
+              </a:solidFill>
+              <a:tailEnd type="triangle" w="lg" len="lg"/>
+            </a:ln>
+          </p:spPr>
+          <p:style>
+            <a:lnRef idx="1">
+              <a:schemeClr val="accent1"/>
+            </a:lnRef>
+            <a:fillRef idx="0">
+              <a:schemeClr val="accent1"/>
+            </a:fillRef>
+            <a:effectRef idx="0">
+              <a:schemeClr val="accent1"/>
+            </a:effectRef>
+            <a:fontRef idx="minor">
+              <a:schemeClr val="tx1"/>
+            </a:fontRef>
+          </p:style>
+        </p:cxnSp>
+        <p:sp>
+          <p:nvSpPr>
+            <p:cNvPr id="29" name="流程圖: 磁碟 28"/>
+            <p:cNvSpPr/>
+            <p:nvPr/>
+          </p:nvSpPr>
+          <p:spPr>
+            <a:xfrm>
+              <a:off x="2075652" y="7827804"/>
+              <a:ext cx="3276600" cy="1859280"/>
+            </a:xfrm>
+            <a:prstGeom prst="flowChartMagneticDisk">
+              <a:avLst/>
+            </a:prstGeom>
+            <a:noFill/>
+            <a:ln w="31750">
+              <a:solidFill>
+                <a:srgbClr val="282828"/>
+              </a:solidFill>
+            </a:ln>
+          </p:spPr>
+          <p:style>
+            <a:lnRef idx="2">
+              <a:schemeClr val="accent1">
+                <a:shade val="50000"/>
+              </a:schemeClr>
+            </a:lnRef>
+            <a:fillRef idx="1">
+              <a:schemeClr val="accent1"/>
+            </a:fillRef>
+            <a:effectRef idx="0">
+              <a:schemeClr val="accent1"/>
+            </a:effectRef>
+            <a:fontRef idx="minor">
+              <a:schemeClr val="lt1"/>
+            </a:fontRef>
+          </p:style>
+          <p:txBody>
+            <a:bodyPr rtlCol="0" anchor="ctr"/>
+            <a:lstStyle/>
+            <a:p>
+              <a:pPr algn="ctr"/>
+              <a:r>
+                <a:rPr lang="en-US" altLang="zh-TW" sz="3600" dirty="0" smtClean="0">
+                  <a:solidFill>
+                    <a:srgbClr val="282828"/>
+                  </a:solidFill>
+                  <a:latin typeface="SauceCodePro Nerd Font" panose="020B0509030403020204" pitchFamily="49" charset="0"/>
+                </a:rPr>
+                <a:t>.docs</a:t>
+              </a:r>
+              <a:endParaRPr lang="zh-TW" altLang="en-US" sz="3600" dirty="0">
+                <a:solidFill>
+                  <a:srgbClr val="282828"/>
+                </a:solidFill>
+                <a:latin typeface="SauceCodePro Nerd Font" panose="020B0509030403020204" pitchFamily="49" charset="0"/>
+              </a:endParaRPr>
+            </a:p>
+          </p:txBody>
+        </p:sp>
+        <p:sp>
+          <p:nvSpPr>
+            <p:cNvPr id="30" name="流程圖: 磁碟 29"/>
+            <p:cNvSpPr/>
+            <p:nvPr/>
+          </p:nvSpPr>
+          <p:spPr>
+            <a:xfrm>
+              <a:off x="5545764" y="9557725"/>
+              <a:ext cx="3276600" cy="1859280"/>
+            </a:xfrm>
+            <a:prstGeom prst="flowChartMagneticDisk">
+              <a:avLst/>
+            </a:prstGeom>
+            <a:noFill/>
+            <a:ln w="31750">
+              <a:solidFill>
+                <a:srgbClr val="282828"/>
+              </a:solidFill>
+            </a:ln>
+          </p:spPr>
+          <p:style>
+            <a:lnRef idx="2">
+              <a:schemeClr val="accent1">
+                <a:shade val="50000"/>
+              </a:schemeClr>
+            </a:lnRef>
+            <a:fillRef idx="1">
+              <a:schemeClr val="accent1"/>
+            </a:fillRef>
+            <a:effectRef idx="0">
+              <a:schemeClr val="accent1"/>
+            </a:effectRef>
+            <a:fontRef idx="minor">
+              <a:schemeClr val="lt1"/>
+            </a:fontRef>
+          </p:style>
+          <p:txBody>
+            <a:bodyPr rtlCol="0" anchor="ctr"/>
+            <a:lstStyle/>
+            <a:p>
+              <a:pPr algn="ctr"/>
+              <a:r>
+                <a:rPr lang="en-US" altLang="zh-TW" sz="3600" dirty="0" smtClean="0">
+                  <a:solidFill>
+                    <a:srgbClr val="282828"/>
+                  </a:solidFill>
+                  <a:latin typeface="SauceCodePro Nerd Font" panose="020B0509030403020204" pitchFamily="49" charset="0"/>
+                </a:rPr>
+                <a:t>.</a:t>
+              </a:r>
+              <a:r>
+                <a:rPr lang="en-US" altLang="zh-TW" sz="3600" dirty="0" err="1" smtClean="0">
+                  <a:solidFill>
+                    <a:srgbClr val="282828"/>
+                  </a:solidFill>
+                  <a:latin typeface="SauceCodePro Nerd Font" panose="020B0509030403020204" pitchFamily="49" charset="0"/>
+                </a:rPr>
+                <a:t>token_dict</a:t>
+              </a:r>
+              <a:endParaRPr lang="zh-TW" altLang="en-US" sz="3600" dirty="0">
+                <a:solidFill>
+                  <a:srgbClr val="282828"/>
+                </a:solidFill>
+                <a:latin typeface="SauceCodePro Nerd Font" panose="020B0509030403020204" pitchFamily="49" charset="0"/>
+              </a:endParaRPr>
+            </a:p>
+          </p:txBody>
+        </p:sp>
+        <p:cxnSp>
+          <p:nvCxnSpPr>
+            <p:cNvPr id="38" name="直線單箭頭接點 26"/>
+            <p:cNvCxnSpPr>
+              <a:stCxn id="115" idx="0"/>
+              <a:endCxn id="136" idx="2"/>
+            </p:cNvCxnSpPr>
+            <p:nvPr/>
+          </p:nvCxnSpPr>
+          <p:spPr>
+            <a:xfrm flipV="1">
+              <a:off x="10798956" y="11417005"/>
+              <a:ext cx="0" cy="3043523"/>
+            </a:xfrm>
+            <a:prstGeom prst="straightConnector1">
+              <a:avLst/>
+            </a:prstGeom>
+            <a:ln w="76200">
+              <a:solidFill>
+                <a:srgbClr val="282828"/>
+              </a:solidFill>
+              <a:tailEnd type="triangle" w="lg" len="lg"/>
+            </a:ln>
+          </p:spPr>
+          <p:style>
+            <a:lnRef idx="1">
+              <a:schemeClr val="accent1"/>
+            </a:lnRef>
+            <a:fillRef idx="0">
+              <a:schemeClr val="accent1"/>
+            </a:fillRef>
+            <a:effectRef idx="0">
+              <a:schemeClr val="accent1"/>
+            </a:effectRef>
+            <a:fontRef idx="minor">
+              <a:schemeClr val="tx1"/>
+            </a:fontRef>
+          </p:style>
+        </p:cxnSp>
+        <p:cxnSp>
+          <p:nvCxnSpPr>
+            <p:cNvPr id="42" name="直線接點 40"/>
+            <p:cNvCxnSpPr>
+              <a:stCxn id="30" idx="4"/>
+              <a:endCxn id="136" idx="1"/>
+            </p:cNvCxnSpPr>
+            <p:nvPr/>
+          </p:nvCxnSpPr>
+          <p:spPr>
+            <a:xfrm>
+              <a:off x="8822364" y="10487365"/>
+              <a:ext cx="676584" cy="9917"/>
+            </a:xfrm>
+            <a:prstGeom prst="curvedConnector3">
+              <a:avLst>
+                <a:gd name="adj1" fmla="val 50000"/>
+              </a:avLst>
+            </a:prstGeom>
+            <a:ln w="63500">
+              <a:solidFill>
+                <a:srgbClr val="FF0066"/>
+              </a:solidFill>
+              <a:tailEnd type="triangle" w="lg" len="lg"/>
+            </a:ln>
+          </p:spPr>
+          <p:style>
+            <a:lnRef idx="1">
+              <a:schemeClr val="accent1"/>
+            </a:lnRef>
+            <a:fillRef idx="0">
+              <a:schemeClr val="accent1"/>
+            </a:fillRef>
+            <a:effectRef idx="0">
+              <a:schemeClr val="accent1"/>
+            </a:effectRef>
+            <a:fontRef idx="minor">
+              <a:schemeClr val="tx1"/>
+            </a:fontRef>
+          </p:style>
+        </p:cxnSp>
+        <p:sp>
+          <p:nvSpPr>
+            <p:cNvPr id="45" name="圓角矩形 44"/>
+            <p:cNvSpPr/>
+            <p:nvPr/>
+          </p:nvSpPr>
+          <p:spPr>
+            <a:xfrm>
+              <a:off x="13537548" y="9772884"/>
+              <a:ext cx="3394092" cy="1448794"/>
+            </a:xfrm>
+            <a:prstGeom prst="roundRect">
+              <a:avLst>
+                <a:gd name="adj" fmla="val 12899"/>
+              </a:avLst>
+            </a:prstGeom>
+            <a:noFill/>
+            <a:ln w="31750">
+              <a:solidFill>
+                <a:srgbClr val="282828"/>
+              </a:solidFill>
+            </a:ln>
+          </p:spPr>
+          <p:style>
+            <a:lnRef idx="2">
+              <a:schemeClr val="accent1">
+                <a:shade val="50000"/>
+              </a:schemeClr>
+            </a:lnRef>
+            <a:fillRef idx="1">
+              <a:schemeClr val="accent1"/>
+            </a:fillRef>
+            <a:effectRef idx="0">
+              <a:schemeClr val="accent1"/>
+            </a:effectRef>
+            <a:fontRef idx="minor">
+              <a:schemeClr val="lt1"/>
+            </a:fontRef>
+          </p:style>
+          <p:txBody>
+            <a:bodyPr rtlCol="0" anchor="ctr"/>
+            <a:lstStyle/>
+            <a:p>
+              <a:pPr algn="ctr"/>
+              <a:r>
+                <a:rPr lang="en-US" altLang="zh-TW" sz="3600" dirty="0" smtClean="0">
+                  <a:solidFill>
+                    <a:srgbClr val="282828"/>
+                  </a:solidFill>
+                  <a:latin typeface="SauceCodePro Nerd Font" panose="020B0509030403020204" pitchFamily="49" charset="0"/>
+                </a:rPr>
+                <a:t>Return</a:t>
+              </a:r>
+            </a:p>
+            <a:p>
+              <a:pPr algn="ctr"/>
+              <a:r>
+                <a:rPr lang="en-US" altLang="zh-TW" sz="3600" dirty="0" smtClean="0">
+                  <a:solidFill>
+                    <a:srgbClr val="282828"/>
+                  </a:solidFill>
+                  <a:latin typeface="SauceCodePro Nerd Font" panose="020B0509030403020204" pitchFamily="49" charset="0"/>
+                </a:rPr>
+                <a:t>Doc info</a:t>
+              </a:r>
+              <a:endParaRPr lang="en-US" altLang="zh-TW" sz="3600" dirty="0">
+                <a:solidFill>
+                  <a:srgbClr val="282828"/>
+                </a:solidFill>
+                <a:latin typeface="SauceCodePro Nerd Font" panose="020B0509030403020204" pitchFamily="49" charset="0"/>
+              </a:endParaRPr>
+            </a:p>
+          </p:txBody>
+        </p:sp>
+        <p:cxnSp>
+          <p:nvCxnSpPr>
+            <p:cNvPr id="50" name="直線單箭頭接點 26"/>
+            <p:cNvCxnSpPr>
+              <a:stCxn id="136" idx="3"/>
+              <a:endCxn id="45" idx="1"/>
+            </p:cNvCxnSpPr>
+            <p:nvPr/>
+          </p:nvCxnSpPr>
+          <p:spPr>
+            <a:xfrm flipV="1">
+              <a:off x="12098964" y="10497281"/>
+              <a:ext cx="1438584" cy="1"/>
+            </a:xfrm>
+            <a:prstGeom prst="straightConnector1">
+              <a:avLst/>
+            </a:prstGeom>
+            <a:ln w="76200">
+              <a:solidFill>
+                <a:srgbClr val="282828"/>
+              </a:solidFill>
+              <a:tailEnd type="triangle" w="lg" len="lg"/>
+            </a:ln>
+          </p:spPr>
+          <p:style>
+            <a:lnRef idx="1">
+              <a:schemeClr val="accent1"/>
+            </a:lnRef>
+            <a:fillRef idx="0">
+              <a:schemeClr val="accent1"/>
+            </a:fillRef>
+            <a:effectRef idx="0">
+              <a:schemeClr val="accent1"/>
+            </a:effectRef>
+            <a:fontRef idx="minor">
+              <a:schemeClr val="tx1"/>
+            </a:fontRef>
+          </p:style>
+        </p:cxnSp>
+        <p:cxnSp>
+          <p:nvCxnSpPr>
+            <p:cNvPr id="57" name="直線接點 40"/>
+            <p:cNvCxnSpPr>
+              <a:stCxn id="29" idx="4"/>
+              <a:endCxn id="45" idx="0"/>
+            </p:cNvCxnSpPr>
+            <p:nvPr/>
+          </p:nvCxnSpPr>
+          <p:spPr>
+            <a:xfrm>
+              <a:off x="5352252" y="8757444"/>
+              <a:ext cx="9882342" cy="1015440"/>
+            </a:xfrm>
+            <a:prstGeom prst="bentConnector2">
+              <a:avLst/>
+            </a:prstGeom>
+            <a:ln w="63500">
+              <a:solidFill>
+                <a:srgbClr val="FF0066"/>
+              </a:solidFill>
+              <a:tailEnd type="triangle" w="lg" len="lg"/>
+            </a:ln>
+          </p:spPr>
+          <p:style>
+            <a:lnRef idx="1">
+              <a:schemeClr val="accent1"/>
+            </a:lnRef>
+            <a:fillRef idx="0">
+              <a:schemeClr val="accent1"/>
+            </a:fillRef>
+            <a:effectRef idx="0">
+              <a:schemeClr val="accent1"/>
+            </a:effectRef>
+            <a:fontRef idx="minor">
+              <a:schemeClr val="tx1"/>
+            </a:fontRef>
+          </p:style>
+        </p:cxnSp>
+        <p:cxnSp>
+          <p:nvCxnSpPr>
+            <p:cNvPr id="78" name="直線單箭頭接點 26"/>
+            <p:cNvCxnSpPr>
+              <a:stCxn id="136" idx="3"/>
+              <a:endCxn id="99" idx="3"/>
+            </p:cNvCxnSpPr>
+            <p:nvPr/>
+          </p:nvCxnSpPr>
+          <p:spPr>
+            <a:xfrm>
+              <a:off x="12098964" y="10497282"/>
+              <a:ext cx="1556725" cy="4692918"/>
+            </a:xfrm>
+            <a:prstGeom prst="bentConnector3">
+              <a:avLst>
+                <a:gd name="adj1" fmla="val 40210"/>
+              </a:avLst>
+            </a:prstGeom>
+            <a:ln w="76200">
+              <a:solidFill>
+                <a:srgbClr val="282828"/>
+              </a:solidFill>
+              <a:tailEnd type="triangle" w="lg" len="lg"/>
+            </a:ln>
+          </p:spPr>
+          <p:style>
+            <a:lnRef idx="1">
+              <a:schemeClr val="accent1"/>
+            </a:lnRef>
+            <a:fillRef idx="0">
+              <a:schemeClr val="accent1"/>
+            </a:fillRef>
+            <a:effectRef idx="0">
+              <a:schemeClr val="accent1"/>
+            </a:effectRef>
+            <a:fontRef idx="minor">
+              <a:schemeClr val="tx1"/>
+            </a:fontRef>
+          </p:style>
+        </p:cxnSp>
+        <p:cxnSp>
+          <p:nvCxnSpPr>
+            <p:cNvPr id="83" name="直線單箭頭接點 26"/>
+            <p:cNvCxnSpPr>
+              <a:stCxn id="45" idx="2"/>
+              <a:endCxn id="99" idx="3"/>
+            </p:cNvCxnSpPr>
+            <p:nvPr/>
+          </p:nvCxnSpPr>
+          <p:spPr>
+            <a:xfrm rot="5400000">
+              <a:off x="12460881" y="12416487"/>
+              <a:ext cx="3968522" cy="1578905"/>
+            </a:xfrm>
+            <a:prstGeom prst="bentConnector4">
+              <a:avLst>
+                <a:gd name="adj1" fmla="val 47641"/>
+                <a:gd name="adj2" fmla="val 158878"/>
+              </a:avLst>
+            </a:prstGeom>
+            <a:ln w="76200">
+              <a:solidFill>
+                <a:srgbClr val="282828"/>
+              </a:solidFill>
+              <a:tailEnd type="triangle" w="lg" len="lg"/>
+            </a:ln>
+          </p:spPr>
+          <p:style>
+            <a:lnRef idx="1">
+              <a:schemeClr val="accent1"/>
+            </a:lnRef>
+            <a:fillRef idx="0">
+              <a:schemeClr val="accent1"/>
+            </a:fillRef>
+            <a:effectRef idx="0">
+              <a:schemeClr val="accent1"/>
+            </a:effectRef>
+            <a:fontRef idx="minor">
+              <a:schemeClr val="tx1"/>
+            </a:fontRef>
+          </p:style>
+        </p:cxnSp>
+        <p:grpSp>
+          <p:nvGrpSpPr>
+            <p:cNvPr id="90" name="群組 89"/>
+            <p:cNvGrpSpPr/>
+            <p:nvPr/>
+          </p:nvGrpSpPr>
+          <p:grpSpPr>
+            <a:xfrm>
+              <a:off x="13655689" y="14254023"/>
+              <a:ext cx="4890316" cy="1865693"/>
+              <a:chOff x="11502520" y="14437046"/>
+              <a:chExt cx="4890316" cy="1865693"/>
+            </a:xfrm>
+          </p:grpSpPr>
+          <p:sp>
+            <p:nvSpPr>
+              <p:cNvPr id="87" name="矩形 86"/>
+              <p:cNvSpPr/>
+              <p:nvPr/>
+            </p:nvSpPr>
+            <p:spPr>
+              <a:xfrm>
+                <a:off x="11502522" y="14437046"/>
+                <a:ext cx="2530328" cy="374450"/>
+              </a:xfrm>
+              <a:prstGeom prst="rect">
+                <a:avLst/>
+              </a:prstGeom>
+              <a:noFill/>
+              <a:ln w="31750">
+                <a:solidFill>
+                  <a:srgbClr val="282828"/>
+                </a:solidFill>
+              </a:ln>
+            </p:spPr>
+            <p:style>
+              <a:lnRef idx="2">
+                <a:schemeClr val="accent1">
+                  <a:shade val="50000"/>
+                </a:schemeClr>
+              </a:lnRef>
+              <a:fillRef idx="1">
+                <a:schemeClr val="accent1"/>
+              </a:fillRef>
+              <a:effectRef idx="0">
+                <a:schemeClr val="accent1"/>
+              </a:effectRef>
+              <a:fontRef idx="minor">
+                <a:schemeClr val="lt1"/>
+              </a:fontRef>
+            </p:style>
+            <p:txBody>
+              <a:bodyPr rtlCol="0" anchor="ctr"/>
+              <a:lstStyle/>
+              <a:p>
+                <a:pPr algn="ctr"/>
+                <a:endParaRPr lang="zh-TW" altLang="en-US"/>
+              </a:p>
+            </p:txBody>
+          </p:sp>
+          <p:sp>
+            <p:nvSpPr>
+              <p:cNvPr id="97" name="矩形 96"/>
+              <p:cNvSpPr/>
+              <p:nvPr/>
+            </p:nvSpPr>
+            <p:spPr>
+              <a:xfrm>
+                <a:off x="15069170" y="14437046"/>
+                <a:ext cx="1323666" cy="374450"/>
+              </a:xfrm>
+              <a:prstGeom prst="rect">
+                <a:avLst/>
+              </a:prstGeom>
+              <a:noFill/>
+              <a:ln w="31750">
+                <a:solidFill>
+                  <a:srgbClr val="282828"/>
+                </a:solidFill>
+              </a:ln>
+            </p:spPr>
+            <p:style>
+              <a:lnRef idx="2">
+                <a:schemeClr val="accent1">
+                  <a:shade val="50000"/>
+                </a:schemeClr>
+              </a:lnRef>
+              <a:fillRef idx="1">
+                <a:schemeClr val="accent1"/>
+              </a:fillRef>
+              <a:effectRef idx="0">
+                <a:schemeClr val="accent1"/>
+              </a:effectRef>
+              <a:fontRef idx="minor">
+                <a:schemeClr val="lt1"/>
+              </a:fontRef>
+            </p:style>
+            <p:txBody>
+              <a:bodyPr rtlCol="0" anchor="ctr"/>
+              <a:lstStyle/>
+              <a:p>
+                <a:pPr algn="ctr"/>
+                <a:endParaRPr lang="zh-TW" altLang="en-US"/>
+              </a:p>
+            </p:txBody>
+          </p:sp>
+          <p:sp>
+            <p:nvSpPr>
+              <p:cNvPr id="96" name="矩形 95"/>
+              <p:cNvSpPr/>
+              <p:nvPr/>
+            </p:nvSpPr>
+            <p:spPr>
+              <a:xfrm>
+                <a:off x="14042684" y="14437046"/>
+                <a:ext cx="1016652" cy="374450"/>
+              </a:xfrm>
+              <a:prstGeom prst="rect">
+                <a:avLst/>
+              </a:prstGeom>
+              <a:solidFill>
+                <a:srgbClr val="FF0066"/>
+              </a:solidFill>
+              <a:ln w="31750">
+                <a:solidFill>
+                  <a:srgbClr val="282828"/>
+                </a:solidFill>
+              </a:ln>
+            </p:spPr>
+            <p:style>
+              <a:lnRef idx="2">
+                <a:schemeClr val="accent1">
+                  <a:shade val="50000"/>
+                </a:schemeClr>
+              </a:lnRef>
+              <a:fillRef idx="1">
+                <a:schemeClr val="accent1"/>
+              </a:fillRef>
+              <a:effectRef idx="0">
+                <a:schemeClr val="accent1"/>
+              </a:effectRef>
+              <a:fontRef idx="minor">
+                <a:schemeClr val="lt1"/>
+              </a:fontRef>
+            </p:style>
+            <p:txBody>
+              <a:bodyPr rtlCol="0" anchor="ctr"/>
+              <a:lstStyle/>
+              <a:p>
+                <a:pPr algn="ctr"/>
+                <a:endParaRPr lang="zh-TW" altLang="en-US"/>
+              </a:p>
+            </p:txBody>
+          </p:sp>
+          <p:grpSp>
+            <p:nvGrpSpPr>
+              <p:cNvPr id="88" name="群組 87"/>
+              <p:cNvGrpSpPr/>
+              <p:nvPr/>
+            </p:nvGrpSpPr>
+            <p:grpSpPr>
+              <a:xfrm rot="10800000">
+                <a:off x="11502520" y="15185998"/>
+                <a:ext cx="4890314" cy="374450"/>
+                <a:chOff x="8711386" y="7086600"/>
+                <a:chExt cx="4890314" cy="374450"/>
+              </a:xfrm>
+            </p:grpSpPr>
+            <p:sp>
+              <p:nvSpPr>
+                <p:cNvPr id="98" name="矩形 97"/>
+                <p:cNvSpPr/>
+                <p:nvPr/>
+              </p:nvSpPr>
+              <p:spPr>
+                <a:xfrm>
+                  <a:off x="8711386" y="7086600"/>
+                  <a:ext cx="2923866" cy="374450"/>
+                </a:xfrm>
+                <a:prstGeom prst="rect">
+                  <a:avLst/>
+                </a:prstGeom>
+                <a:noFill/>
+                <a:ln w="31750">
+                  <a:solidFill>
+                    <a:srgbClr val="282828"/>
+                  </a:solidFill>
+                </a:ln>
+              </p:spPr>
+              <p:style>
+                <a:lnRef idx="2">
+                  <a:schemeClr val="accent1">
+                    <a:shade val="50000"/>
+                  </a:schemeClr>
+                </a:lnRef>
+                <a:fillRef idx="1">
+                  <a:schemeClr val="accent1"/>
+                </a:fillRef>
+                <a:effectRef idx="0">
+                  <a:schemeClr val="accent1"/>
+                </a:effectRef>
+                <a:fontRef idx="minor">
+                  <a:schemeClr val="lt1"/>
+                </a:fontRef>
+              </p:style>
+              <p:txBody>
+                <a:bodyPr rtlCol="0" anchor="ctr"/>
+                <a:lstStyle/>
+                <a:p>
+                  <a:pPr algn="ctr"/>
+                  <a:endParaRPr lang="zh-TW" altLang="en-US"/>
+                </a:p>
+              </p:txBody>
+            </p:sp>
+            <p:sp>
+              <p:nvSpPr>
+                <p:cNvPr id="99" name="矩形 98"/>
+                <p:cNvSpPr/>
+                <p:nvPr/>
+              </p:nvSpPr>
+              <p:spPr>
+                <a:xfrm>
+                  <a:off x="12661738" y="7086600"/>
+                  <a:ext cx="939962" cy="374450"/>
+                </a:xfrm>
+                <a:prstGeom prst="rect">
+                  <a:avLst/>
+                </a:prstGeom>
+                <a:noFill/>
+                <a:ln w="31750">
+                  <a:solidFill>
+                    <a:srgbClr val="282828"/>
+                  </a:solidFill>
+                </a:ln>
+              </p:spPr>
+              <p:style>
+                <a:lnRef idx="2">
+                  <a:schemeClr val="accent1">
+                    <a:shade val="50000"/>
+                  </a:schemeClr>
+                </a:lnRef>
+                <a:fillRef idx="1">
+                  <a:schemeClr val="accent1"/>
+                </a:fillRef>
+                <a:effectRef idx="0">
+                  <a:schemeClr val="accent1"/>
+                </a:effectRef>
+                <a:fontRef idx="minor">
+                  <a:schemeClr val="lt1"/>
+                </a:fontRef>
+              </p:style>
+              <p:txBody>
+                <a:bodyPr rtlCol="0" anchor="ctr"/>
+                <a:lstStyle/>
+                <a:p>
+                  <a:pPr algn="ctr"/>
+                  <a:endParaRPr lang="zh-TW" altLang="en-US"/>
+                </a:p>
+              </p:txBody>
+            </p:sp>
+            <p:sp>
+              <p:nvSpPr>
+                <p:cNvPr id="100" name="矩形 99"/>
+                <p:cNvSpPr/>
+                <p:nvPr/>
+              </p:nvSpPr>
+              <p:spPr>
+                <a:xfrm>
+                  <a:off x="11635252" y="7086600"/>
+                  <a:ext cx="1016652" cy="374450"/>
+                </a:xfrm>
+                <a:prstGeom prst="rect">
+                  <a:avLst/>
+                </a:prstGeom>
+                <a:solidFill>
+                  <a:srgbClr val="FF0066"/>
+                </a:solidFill>
+                <a:ln w="31750">
+                  <a:solidFill>
+                    <a:srgbClr val="282828"/>
+                  </a:solidFill>
+                </a:ln>
+              </p:spPr>
+              <p:style>
+                <a:lnRef idx="2">
+                  <a:schemeClr val="accent1">
+                    <a:shade val="50000"/>
+                  </a:schemeClr>
+                </a:lnRef>
+                <a:fillRef idx="1">
+                  <a:schemeClr val="accent1"/>
+                </a:fillRef>
+                <a:effectRef idx="0">
+                  <a:schemeClr val="accent1"/>
+                </a:effectRef>
+                <a:fontRef idx="minor">
+                  <a:schemeClr val="lt1"/>
+                </a:fontRef>
+              </p:style>
+              <p:txBody>
+                <a:bodyPr rtlCol="0" anchor="ctr"/>
+                <a:lstStyle/>
+                <a:p>
+                  <a:pPr algn="ctr"/>
+                  <a:endParaRPr lang="zh-TW" altLang="en-US"/>
+                </a:p>
+              </p:txBody>
+            </p:sp>
+          </p:grpSp>
+          <p:sp>
+            <p:nvSpPr>
+              <p:cNvPr id="102" name="矩形 101"/>
+              <p:cNvSpPr/>
+              <p:nvPr/>
+            </p:nvSpPr>
+            <p:spPr>
+              <a:xfrm rot="10800000">
+                <a:off x="11502521" y="14814159"/>
+                <a:ext cx="4890313" cy="374450"/>
+              </a:xfrm>
+              <a:prstGeom prst="rect">
+                <a:avLst/>
+              </a:prstGeom>
+              <a:noFill/>
+              <a:ln w="31750">
+                <a:solidFill>
+                  <a:srgbClr val="282828"/>
+                </a:solidFill>
+              </a:ln>
+            </p:spPr>
+            <p:style>
+              <a:lnRef idx="2">
+                <a:schemeClr val="accent1">
+                  <a:shade val="50000"/>
+                </a:schemeClr>
+              </a:lnRef>
+              <a:fillRef idx="1">
+                <a:schemeClr val="accent1"/>
+              </a:fillRef>
+              <a:effectRef idx="0">
+                <a:schemeClr val="accent1"/>
+              </a:effectRef>
+              <a:fontRef idx="minor">
+                <a:schemeClr val="lt1"/>
+              </a:fontRef>
+            </p:style>
+            <p:txBody>
+              <a:bodyPr rtlCol="0" anchor="ctr"/>
+              <a:lstStyle/>
+              <a:p>
+                <a:pPr algn="ctr"/>
+                <a:endParaRPr lang="zh-TW" altLang="en-US"/>
+              </a:p>
+            </p:txBody>
+          </p:sp>
+          <p:sp>
+            <p:nvSpPr>
+              <p:cNvPr id="103" name="矩形 102"/>
+              <p:cNvSpPr/>
+              <p:nvPr/>
+            </p:nvSpPr>
+            <p:spPr>
+              <a:xfrm>
+                <a:off x="11502522" y="15557836"/>
+                <a:ext cx="3454072" cy="374450"/>
+              </a:xfrm>
+              <a:prstGeom prst="rect">
+                <a:avLst/>
+              </a:prstGeom>
+              <a:noFill/>
+              <a:ln w="31750">
+                <a:solidFill>
+                  <a:srgbClr val="282828"/>
+                </a:solidFill>
+              </a:ln>
+            </p:spPr>
+            <p:style>
+              <a:lnRef idx="2">
+                <a:schemeClr val="accent1">
+                  <a:shade val="50000"/>
+                </a:schemeClr>
+              </a:lnRef>
+              <a:fillRef idx="1">
+                <a:schemeClr val="accent1"/>
+              </a:fillRef>
+              <a:effectRef idx="0">
+                <a:schemeClr val="accent1"/>
+              </a:effectRef>
+              <a:fontRef idx="minor">
+                <a:schemeClr val="lt1"/>
+              </a:fontRef>
+            </p:style>
+            <p:txBody>
+              <a:bodyPr rtlCol="0" anchor="ctr"/>
+              <a:lstStyle/>
+              <a:p>
+                <a:pPr algn="ctr"/>
+                <a:endParaRPr lang="zh-TW" altLang="en-US"/>
+              </a:p>
+            </p:txBody>
+          </p:sp>
+          <p:sp>
+            <p:nvSpPr>
+              <p:cNvPr id="105" name="矩形 104"/>
+              <p:cNvSpPr/>
+              <p:nvPr/>
+            </p:nvSpPr>
+            <p:spPr>
+              <a:xfrm>
+                <a:off x="15973248" y="15557836"/>
+                <a:ext cx="419587" cy="374450"/>
+              </a:xfrm>
+              <a:prstGeom prst="rect">
+                <a:avLst/>
+              </a:prstGeom>
+              <a:noFill/>
+              <a:ln w="31750">
+                <a:solidFill>
+                  <a:srgbClr val="282828"/>
+                </a:solidFill>
+              </a:ln>
+            </p:spPr>
+            <p:style>
+              <a:lnRef idx="2">
+                <a:schemeClr val="accent1">
+                  <a:shade val="50000"/>
+                </a:schemeClr>
+              </a:lnRef>
+              <a:fillRef idx="1">
+                <a:schemeClr val="accent1"/>
+              </a:fillRef>
+              <a:effectRef idx="0">
+                <a:schemeClr val="accent1"/>
+              </a:effectRef>
+              <a:fontRef idx="minor">
+                <a:schemeClr val="lt1"/>
+              </a:fontRef>
+            </p:style>
+            <p:txBody>
+              <a:bodyPr rtlCol="0" anchor="ctr"/>
+              <a:lstStyle/>
+              <a:p>
+                <a:pPr algn="ctr"/>
+                <a:endParaRPr lang="zh-TW" altLang="en-US"/>
+              </a:p>
+            </p:txBody>
+          </p:sp>
+          <p:sp>
+            <p:nvSpPr>
+              <p:cNvPr id="106" name="矩形 105"/>
+              <p:cNvSpPr/>
+              <p:nvPr/>
+            </p:nvSpPr>
+            <p:spPr>
+              <a:xfrm>
+                <a:off x="14956595" y="15557836"/>
+                <a:ext cx="1016652" cy="374450"/>
+              </a:xfrm>
+              <a:prstGeom prst="rect">
+                <a:avLst/>
+              </a:prstGeom>
+              <a:solidFill>
+                <a:srgbClr val="FF0066"/>
+              </a:solidFill>
+              <a:ln w="31750">
+                <a:solidFill>
+                  <a:srgbClr val="282828"/>
+                </a:solidFill>
+              </a:ln>
+            </p:spPr>
+            <p:style>
+              <a:lnRef idx="2">
+                <a:schemeClr val="accent1">
+                  <a:shade val="50000"/>
+                </a:schemeClr>
+              </a:lnRef>
+              <a:fillRef idx="1">
+                <a:schemeClr val="accent1"/>
+              </a:fillRef>
+              <a:effectRef idx="0">
+                <a:schemeClr val="accent1"/>
+              </a:effectRef>
+              <a:fontRef idx="minor">
+                <a:schemeClr val="lt1"/>
+              </a:fontRef>
+            </p:style>
+            <p:txBody>
+              <a:bodyPr rtlCol="0" anchor="ctr"/>
+              <a:lstStyle/>
+              <a:p>
+                <a:pPr algn="ctr"/>
+                <a:endParaRPr lang="zh-TW" altLang="en-US"/>
+              </a:p>
+            </p:txBody>
+          </p:sp>
+          <p:sp>
+            <p:nvSpPr>
+              <p:cNvPr id="107" name="矩形 106"/>
+              <p:cNvSpPr/>
+              <p:nvPr/>
+            </p:nvSpPr>
+            <p:spPr>
+              <a:xfrm rot="10800000">
+                <a:off x="11502521" y="15928289"/>
+                <a:ext cx="4890313" cy="374450"/>
+              </a:xfrm>
+              <a:prstGeom prst="rect">
+                <a:avLst/>
+              </a:prstGeom>
+              <a:noFill/>
+              <a:ln w="31750">
+                <a:solidFill>
+                  <a:srgbClr val="282828"/>
+                </a:solidFill>
+              </a:ln>
+            </p:spPr>
+            <p:style>
+              <a:lnRef idx="2">
+                <a:schemeClr val="accent1">
+                  <a:shade val="50000"/>
+                </a:schemeClr>
+              </a:lnRef>
+              <a:fillRef idx="1">
+                <a:schemeClr val="accent1"/>
+              </a:fillRef>
+              <a:effectRef idx="0">
+                <a:schemeClr val="accent1"/>
+              </a:effectRef>
+              <a:fontRef idx="minor">
+                <a:schemeClr val="lt1"/>
+              </a:fontRef>
+            </p:style>
+            <p:txBody>
+              <a:bodyPr rtlCol="0" anchor="ctr"/>
+              <a:lstStyle/>
+              <a:p>
+                <a:pPr algn="ctr"/>
+                <a:endParaRPr lang="zh-TW" altLang="en-US"/>
+              </a:p>
+            </p:txBody>
+          </p:sp>
+        </p:grpSp>
+        <p:sp>
+          <p:nvSpPr>
+            <p:cNvPr id="110" name="圓角矩形 109"/>
+            <p:cNvSpPr/>
+            <p:nvPr/>
+          </p:nvSpPr>
+          <p:spPr>
+            <a:xfrm>
+              <a:off x="15234137" y="11809525"/>
+              <a:ext cx="1697503" cy="860945"/>
+            </a:xfrm>
+            <a:prstGeom prst="roundRect">
+              <a:avLst/>
+            </a:prstGeom>
+            <a:noFill/>
+            <a:ln w="63500">
+              <a:noFill/>
+            </a:ln>
+            <a:effectLst>
+              <a:softEdge rad="63500"/>
+            </a:effectLst>
+          </p:spPr>
+          <p:style>
+            <a:lnRef idx="2">
+              <a:schemeClr val="accent1">
+                <a:shade val="50000"/>
+              </a:schemeClr>
+            </a:lnRef>
+            <a:fillRef idx="1">
+              <a:schemeClr val="accent1"/>
+            </a:fillRef>
+            <a:effectRef idx="0">
+              <a:schemeClr val="accent1"/>
+            </a:effectRef>
+            <a:fontRef idx="minor">
+              <a:schemeClr val="lt1"/>
+            </a:fontRef>
+          </p:style>
+          <p:txBody>
+            <a:bodyPr rtlCol="0" anchor="ctr"/>
+            <a:lstStyle/>
+            <a:p>
+              <a:pPr algn="ctr"/>
+              <a:r>
+                <a:rPr lang="en-US" altLang="zh-TW" sz="4000" dirty="0" smtClean="0">
+                  <a:solidFill>
+                    <a:srgbClr val="282828"/>
+                  </a:solidFill>
+                  <a:latin typeface="SauceCodePro Nerd Font" panose="020B0509030403020204" pitchFamily="49" charset="0"/>
+                </a:rPr>
+                <a:t>docs</a:t>
+              </a:r>
+              <a:endParaRPr lang="zh-TW" altLang="en-US" sz="4000" dirty="0">
+                <a:solidFill>
+                  <a:srgbClr val="282828"/>
+                </a:solidFill>
+                <a:latin typeface="SauceCodePro Nerd Font" panose="020B0509030403020204" pitchFamily="49" charset="0"/>
+              </a:endParaRPr>
+            </a:p>
+          </p:txBody>
+        </p:sp>
+        <p:sp>
+          <p:nvSpPr>
+            <p:cNvPr id="111" name="圓角矩形 110"/>
+            <p:cNvSpPr/>
+            <p:nvPr/>
+          </p:nvSpPr>
+          <p:spPr>
+            <a:xfrm>
+              <a:off x="12546698" y="11342728"/>
+              <a:ext cx="2469620" cy="1206692"/>
+            </a:xfrm>
+            <a:prstGeom prst="roundRect">
+              <a:avLst/>
+            </a:prstGeom>
+            <a:noFill/>
+            <a:ln w="63500">
+              <a:noFill/>
+            </a:ln>
+            <a:effectLst>
+              <a:softEdge rad="63500"/>
+            </a:effectLst>
+          </p:spPr>
+          <p:style>
+            <a:lnRef idx="2">
+              <a:schemeClr val="accent1">
+                <a:shade val="50000"/>
+              </a:schemeClr>
+            </a:lnRef>
+            <a:fillRef idx="1">
+              <a:schemeClr val="accent1"/>
+            </a:fillRef>
+            <a:effectRef idx="0">
+              <a:schemeClr val="accent1"/>
+            </a:effectRef>
+            <a:fontRef idx="minor">
+              <a:schemeClr val="lt1"/>
+            </a:fontRef>
+          </p:style>
+          <p:txBody>
+            <a:bodyPr rtlCol="0" anchor="ctr"/>
+            <a:lstStyle/>
+            <a:p>
+              <a:pPr algn="ctr"/>
+              <a:r>
+                <a:rPr lang="en-US" altLang="zh-TW" sz="3600" dirty="0" smtClean="0">
+                  <a:solidFill>
+                    <a:srgbClr val="282828"/>
+                  </a:solidFill>
+                  <a:latin typeface="SauceCodePro Nerd Font" panose="020B0509030403020204" pitchFamily="49" charset="0"/>
+                </a:rPr>
+                <a:t>keyword</a:t>
+              </a:r>
+            </a:p>
+            <a:p>
+              <a:pPr algn="ctr"/>
+              <a:r>
+                <a:rPr lang="en-US" altLang="zh-TW" sz="3600" dirty="0" err="1" smtClean="0">
+                  <a:solidFill>
+                    <a:srgbClr val="282828"/>
+                  </a:solidFill>
+                  <a:latin typeface="SauceCodePro Nerd Font" panose="020B0509030403020204" pitchFamily="49" charset="0"/>
+                </a:rPr>
+                <a:t>pos</a:t>
+              </a:r>
+              <a:endParaRPr lang="zh-TW" altLang="en-US" sz="3600" dirty="0">
+                <a:solidFill>
+                  <a:srgbClr val="282828"/>
+                </a:solidFill>
+                <a:latin typeface="SauceCodePro Nerd Font" panose="020B0509030403020204" pitchFamily="49" charset="0"/>
+              </a:endParaRPr>
+            </a:p>
+          </p:txBody>
+        </p:sp>
+        <p:sp>
+          <p:nvSpPr>
+            <p:cNvPr id="115" name="圓角矩形 114"/>
+            <p:cNvSpPr/>
+            <p:nvPr/>
+          </p:nvSpPr>
+          <p:spPr>
+            <a:xfrm>
+              <a:off x="9181611" y="14460528"/>
+              <a:ext cx="3234690" cy="1101510"/>
+            </a:xfrm>
+            <a:prstGeom prst="roundRect">
+              <a:avLst>
+                <a:gd name="adj" fmla="val 12899"/>
+              </a:avLst>
+            </a:prstGeom>
+            <a:solidFill>
+              <a:srgbClr val="00B0F0"/>
+            </a:solidFill>
+            <a:ln w="31750">
+              <a:solidFill>
+                <a:srgbClr val="282828"/>
+              </a:solidFill>
+            </a:ln>
+          </p:spPr>
+          <p:style>
+            <a:lnRef idx="2">
+              <a:schemeClr val="accent1">
+                <a:shade val="50000"/>
+              </a:schemeClr>
+            </a:lnRef>
+            <a:fillRef idx="1">
+              <a:schemeClr val="accent1"/>
+            </a:fillRef>
+            <a:effectRef idx="0">
+              <a:schemeClr val="accent1"/>
+            </a:effectRef>
+            <a:fontRef idx="minor">
+              <a:schemeClr val="lt1"/>
+            </a:fontRef>
+          </p:style>
+          <p:txBody>
+            <a:bodyPr rtlCol="0" anchor="ctr"/>
+            <a:lstStyle/>
+            <a:p>
+              <a:pPr algn="ctr"/>
+              <a:r>
+                <a:rPr lang="en-US" altLang="zh-TW" sz="3600" dirty="0" smtClean="0">
+                  <a:solidFill>
+                    <a:srgbClr val="282828"/>
+                  </a:solidFill>
+                  <a:latin typeface="SauceCodePro Nerd Font" panose="020B0509030403020204" pitchFamily="49" charset="0"/>
+                </a:rPr>
+                <a:t>Keyword</a:t>
+              </a:r>
+              <a:endParaRPr lang="en-US" altLang="zh-TW" sz="3600" dirty="0">
+                <a:solidFill>
+                  <a:srgbClr val="282828"/>
+                </a:solidFill>
+                <a:latin typeface="SauceCodePro Nerd Font" panose="020B0509030403020204" pitchFamily="49" charset="0"/>
+              </a:endParaRPr>
+            </a:p>
+          </p:txBody>
+        </p:sp>
+        <p:sp>
+          <p:nvSpPr>
+            <p:cNvPr id="137" name="圓角矩形 136"/>
+            <p:cNvSpPr/>
+            <p:nvPr/>
+          </p:nvSpPr>
+          <p:spPr>
+            <a:xfrm>
+              <a:off x="14590276" y="16117103"/>
+              <a:ext cx="2935493" cy="860945"/>
+            </a:xfrm>
+            <a:prstGeom prst="roundRect">
+              <a:avLst/>
+            </a:prstGeom>
+            <a:noFill/>
+            <a:ln w="63500">
+              <a:noFill/>
+            </a:ln>
+            <a:effectLst>
+              <a:softEdge rad="63500"/>
+            </a:effectLst>
+          </p:spPr>
+          <p:style>
+            <a:lnRef idx="2">
+              <a:schemeClr val="accent1">
+                <a:shade val="50000"/>
+              </a:schemeClr>
+            </a:lnRef>
+            <a:fillRef idx="1">
+              <a:schemeClr val="accent1"/>
+            </a:fillRef>
+            <a:effectRef idx="0">
+              <a:schemeClr val="accent1"/>
+            </a:effectRef>
+            <a:fontRef idx="minor">
+              <a:schemeClr val="lt1"/>
+            </a:fontRef>
+          </p:style>
+          <p:txBody>
+            <a:bodyPr rtlCol="0" anchor="ctr"/>
+            <a:lstStyle/>
+            <a:p>
+              <a:pPr algn="ctr"/>
+              <a:r>
+                <a:rPr lang="en-US" altLang="zh-TW" sz="4400" dirty="0" smtClean="0">
+                  <a:solidFill>
+                    <a:srgbClr val="282828"/>
+                  </a:solidFill>
+                  <a:latin typeface="SauceCodePro Nerd Font" panose="020B0509030403020204" pitchFamily="49" charset="0"/>
+                </a:rPr>
+                <a:t>show</a:t>
+              </a:r>
+              <a:endParaRPr lang="zh-TW" altLang="en-US" sz="4400" dirty="0">
+                <a:solidFill>
+                  <a:srgbClr val="282828"/>
+                </a:solidFill>
+                <a:latin typeface="SauceCodePro Nerd Font" panose="020B0509030403020204" pitchFamily="49" charset="0"/>
+              </a:endParaRPr>
+            </a:p>
+          </p:txBody>
+        </p:sp>
+      </p:grpSp>
+    </p:spTree>
+    <p:extLst>
+      <p:ext uri="{BB962C8B-B14F-4D97-AF65-F5344CB8AC3E}">
+        <p14:creationId xmlns:p14="http://schemas.microsoft.com/office/powerpoint/2010/main" val="2241720796"/>
+      </p:ext>
+    </p:extLst>
+  </p:cSld>
+  <p:clrMapOvr>
+    <a:masterClrMapping/>
+  </p:clrMapOvr>
+  <p:timing>
+    <p:tnLst>
+      <p:par>
+        <p:cTn id="1" dur="indefinite" restart="never" nodeType="tmRoot"/>
+      </p:par>
+    </p:tnLst>
+  </p:timing>
+</p:sld>
+</file>
+
 <file path=ppt/theme/theme1.xml><?xml version="1.0" encoding="utf-8"?>
 <a:theme xmlns:a="http://schemas.openxmlformats.org/drawingml/2006/main" name="Office 佈景主題">
   <a:themeElements>

</xml_diff>